<commit_message>
Fixed title slide for part1
</commit_message>
<xml_diff>
--- a/part1/src/slides.pptx
+++ b/part1/src/slides.pptx
@@ -5,7 +5,7 @@
     <p:sldMasterId id="2147483648" r:id="rId1"/>
   </p:sldMasterIdLst>
   <p:notesMasterIdLst>
-    <p:NotesMasterId r:id="rId24"/>
+    <p:NotesMasterId r:id="rId25"/>
   </p:notesMasterIdLst>
   <p:sldIdLst>
     <p:sldId id="256" r:id="rId2"/>
@@ -30,6 +30,7 @@
     <p:sldId id="275" r:id="rId21"/>
     <p:sldId id="276" r:id="rId22"/>
     <p:sldId id="277" r:id="rId23"/>
+    <p:sldId id="278" r:id="rId24"/>
   </p:sldIdLst>
   <p:sldSz cx="9144000" cy="6858000" type="screen4x3"/>
   <p:notesSz cx="6858000" cy="9144000"/>
@@ -2881,6 +2882,510 @@
             <a:fld id="{18BDFEC3-8487-43E8-A154-7C12CBC1FFF2}" type="slidenum">
               <a:rPr lang="en-US"/>
               <a:t>22</a:t>
+            </a:fld>
+            <a:endParaRPr lang="en-US"/>
+          </a:p>
+        </p:txBody>
+      </p:sp>
+    </p:spTree>
+  </p:cSld>
+</p:notes>
+</file>
+
+<file path=ppt/notesSlides/notesSlide17.xml><?xml version="1.0" encoding="utf-8"?>
+<p:notes xmlns:a="http://schemas.openxmlformats.org/drawingml/2006/main" xmlns:r="http://schemas.openxmlformats.org/officeDocument/2006/relationships" xmlns:p="http://schemas.openxmlformats.org/presentationml/2006/main">
+  <p:cSld>
+    <p:spTree>
+      <p:nvGrpSpPr>
+        <p:cNvPr id="1" name=""/>
+        <p:cNvGrpSpPr/>
+        <p:nvPr/>
+      </p:nvGrpSpPr>
+      <p:grpSpPr>
+        <a:xfrm>
+          <a:off x="0" y="0"/>
+          <a:ext cx="0" cy="0"/>
+          <a:chOff x="0" y="0"/>
+          <a:chExt cx="0" cy="0"/>
+        </a:xfrm>
+      </p:grpSpPr>
+      <p:sp>
+        <p:nvSpPr>
+          <p:cNvPr id="2" name="Slide Image Placeholder 1"/>
+          <p:cNvSpPr>
+            <a:spLocks noGrp="1" noRot="1" noChangeAspect="1"/>
+          </p:cNvSpPr>
+          <p:nvPr>
+            <p:ph type="sldImg"/>
+          </p:nvPr>
+        </p:nvSpPr>
+        <p:spPr/>
+      </p:sp>
+      <p:sp>
+        <p:nvSpPr>
+          <p:cNvPr id="3" name="Notes Placeholder 2"/>
+          <p:cNvSpPr>
+            <a:spLocks noGrp="1"/>
+          </p:cNvSpPr>
+          <p:nvPr>
+            <p:ph type="body" idx="1"/>
+          </p:nvPr>
+        </p:nvSpPr>
+        <p:spPr/>
+        <p:txBody>
+          <a:bodyPr/>
+          <a:lstStyle/>
+          <a:p>
+            <a:pPr lvl="0" marL="0" indent="0">
+              <a:buNone/>
+            </a:pPr>
+            <a:r>
+              <a:rPr/>
+              <a:t>This</a:t>
+            </a:r>
+            <a:r>
+              <a:rPr/>
+              <a:t> </a:t>
+            </a:r>
+            <a:r>
+              <a:rPr/>
+              <a:t>is</a:t>
+            </a:r>
+            <a:r>
+              <a:rPr/>
+              <a:t> </a:t>
+            </a:r>
+            <a:r>
+              <a:rPr/>
+              <a:t>a</a:t>
+            </a:r>
+            <a:r>
+              <a:rPr/>
+              <a:t> </a:t>
+            </a:r>
+            <a:r>
+              <a:rPr/>
+              <a:t>very</a:t>
+            </a:r>
+            <a:r>
+              <a:rPr/>
+              <a:t> </a:t>
+            </a:r>
+            <a:r>
+              <a:rPr/>
+              <a:t>basic</a:t>
+            </a:r>
+            <a:r>
+              <a:rPr/>
+              <a:t> </a:t>
+            </a:r>
+            <a:r>
+              <a:rPr/>
+              <a:t>start.</a:t>
+            </a:r>
+            <a:r>
+              <a:rPr/>
+              <a:t> </a:t>
+            </a:r>
+            <a:r>
+              <a:rPr/>
+              <a:t>You</a:t>
+            </a:r>
+            <a:r>
+              <a:rPr/>
+              <a:t> </a:t>
+            </a:r>
+            <a:r>
+              <a:rPr/>
+              <a:t>saw</a:t>
+            </a:r>
+            <a:r>
+              <a:rPr/>
+              <a:t> </a:t>
+            </a:r>
+            <a:r>
+              <a:rPr/>
+              <a:t>the</a:t>
+            </a:r>
+            <a:r>
+              <a:rPr/>
+              <a:t> </a:t>
+            </a:r>
+            <a:r>
+              <a:rPr/>
+              <a:t>web</a:t>
+            </a:r>
+            <a:r>
+              <a:rPr/>
+              <a:t> </a:t>
+            </a:r>
+            <a:r>
+              <a:rPr/>
+              <a:t>pages</a:t>
+            </a:r>
+            <a:r>
+              <a:rPr/>
+              <a:t> </a:t>
+            </a:r>
+            <a:r>
+              <a:rPr/>
+              <a:t>where</a:t>
+            </a:r>
+            <a:r>
+              <a:rPr/>
+              <a:t> </a:t>
+            </a:r>
+            <a:r>
+              <a:rPr/>
+              <a:t>you</a:t>
+            </a:r>
+            <a:r>
+              <a:rPr/>
+              <a:t> </a:t>
+            </a:r>
+            <a:r>
+              <a:rPr/>
+              <a:t>install</a:t>
+            </a:r>
+            <a:r>
+              <a:rPr/>
+              <a:t> </a:t>
+            </a:r>
+            <a:r>
+              <a:rPr/>
+              <a:t>R</a:t>
+            </a:r>
+            <a:r>
+              <a:rPr/>
+              <a:t> </a:t>
+            </a:r>
+            <a:r>
+              <a:rPr/>
+              <a:t>and</a:t>
+            </a:r>
+            <a:r>
+              <a:rPr/>
+              <a:t> </a:t>
+            </a:r>
+            <a:r>
+              <a:rPr/>
+              <a:t>RStudio</a:t>
+            </a:r>
+            <a:r>
+              <a:rPr/>
+              <a:t> </a:t>
+            </a:r>
+            <a:r>
+              <a:rPr/>
+              <a:t>from.</a:t>
+            </a:r>
+            <a:r>
+              <a:rPr/>
+              <a:t> </a:t>
+            </a:r>
+            <a:r>
+              <a:rPr/>
+              <a:t>Then</a:t>
+            </a:r>
+            <a:r>
+              <a:rPr/>
+              <a:t> </a:t>
+            </a:r>
+            <a:r>
+              <a:rPr/>
+              <a:t>you</a:t>
+            </a:r>
+            <a:r>
+              <a:rPr/>
+              <a:t> </a:t>
+            </a:r>
+            <a:r>
+              <a:rPr/>
+              <a:t>saw</a:t>
+            </a:r>
+            <a:r>
+              <a:rPr/>
+              <a:t> </a:t>
+            </a:r>
+            <a:r>
+              <a:rPr/>
+              <a:t>the</a:t>
+            </a:r>
+            <a:r>
+              <a:rPr/>
+              <a:t> </a:t>
+            </a:r>
+            <a:r>
+              <a:rPr/>
+              <a:t>pieces</a:t>
+            </a:r>
+            <a:r>
+              <a:rPr/>
+              <a:t> </a:t>
+            </a:r>
+            <a:r>
+              <a:rPr/>
+              <a:t>of</a:t>
+            </a:r>
+            <a:r>
+              <a:rPr/>
+              <a:t> </a:t>
+            </a:r>
+            <a:r>
+              <a:rPr/>
+              <a:t>a</a:t>
+            </a:r>
+            <a:r>
+              <a:rPr/>
+              <a:t> </a:t>
+            </a:r>
+            <a:r>
+              <a:rPr/>
+              <a:t>small</a:t>
+            </a:r>
+            <a:r>
+              <a:rPr/>
+              <a:t> </a:t>
+            </a:r>
+            <a:r>
+              <a:rPr/>
+              <a:t>program</a:t>
+            </a:r>
+            <a:r>
+              <a:rPr/>
+              <a:t> </a:t>
+            </a:r>
+            <a:r>
+              <a:rPr/>
+              <a:t>written</a:t>
+            </a:r>
+            <a:r>
+              <a:rPr/>
+              <a:t> </a:t>
+            </a:r>
+            <a:r>
+              <a:rPr/>
+              <a:t>in</a:t>
+            </a:r>
+            <a:r>
+              <a:rPr/>
+              <a:t> </a:t>
+            </a:r>
+            <a:r>
+              <a:rPr/>
+              <a:t>Rmarkdown,</a:t>
+            </a:r>
+            <a:r>
+              <a:rPr/>
+              <a:t> </a:t>
+            </a:r>
+            <a:r>
+              <a:rPr/>
+              <a:t>as</a:t>
+            </a:r>
+            <a:r>
+              <a:rPr/>
+              <a:t> </a:t>
+            </a:r>
+            <a:r>
+              <a:rPr/>
+              <a:t>well</a:t>
+            </a:r>
+            <a:r>
+              <a:rPr/>
+              <a:t> </a:t>
+            </a:r>
+            <a:r>
+              <a:rPr/>
+              <a:t>as</a:t>
+            </a:r>
+            <a:r>
+              <a:rPr/>
+              <a:t> </a:t>
+            </a:r>
+            <a:r>
+              <a:rPr/>
+              <a:t>the</a:t>
+            </a:r>
+            <a:r>
+              <a:rPr/>
+              <a:t> </a:t>
+            </a:r>
+            <a:r>
+              <a:rPr/>
+              <a:t>output.</a:t>
+            </a:r>
+          </a:p>
+          <a:p>
+            <a:pPr lvl="0" marL="0" indent="0">
+              <a:buNone/>
+            </a:pPr>
+          </a:p>
+          <a:p>
+            <a:pPr lvl="0" marL="0" indent="0">
+              <a:buNone/>
+            </a:pPr>
+            <a:r>
+              <a:rPr/>
+              <a:t>Take</a:t>
+            </a:r>
+            <a:r>
+              <a:rPr/>
+              <a:t> </a:t>
+            </a:r>
+            <a:r>
+              <a:rPr/>
+              <a:t>a</a:t>
+            </a:r>
+            <a:r>
+              <a:rPr/>
+              <a:t> </a:t>
+            </a:r>
+            <a:r>
+              <a:rPr/>
+              <a:t>look</a:t>
+            </a:r>
+            <a:r>
+              <a:rPr/>
+              <a:t> </a:t>
+            </a:r>
+            <a:r>
+              <a:rPr/>
+              <a:t>at</a:t>
+            </a:r>
+            <a:r>
+              <a:rPr/>
+              <a:t> </a:t>
+            </a:r>
+            <a:r>
+              <a:rPr/>
+              <a:t>Canvas,</a:t>
+            </a:r>
+            <a:r>
+              <a:rPr/>
+              <a:t> </a:t>
+            </a:r>
+            <a:r>
+              <a:rPr/>
+              <a:t>please,</a:t>
+            </a:r>
+            <a:r>
+              <a:rPr/>
+              <a:t> </a:t>
+            </a:r>
+            <a:r>
+              <a:rPr/>
+              <a:t>to</a:t>
+            </a:r>
+            <a:r>
+              <a:rPr/>
+              <a:t> </a:t>
+            </a:r>
+            <a:r>
+              <a:rPr/>
+              <a:t>see</a:t>
+            </a:r>
+            <a:r>
+              <a:rPr/>
+              <a:t> </a:t>
+            </a:r>
+            <a:r>
+              <a:rPr/>
+              <a:t>the</a:t>
+            </a:r>
+            <a:r>
+              <a:rPr/>
+              <a:t> </a:t>
+            </a:r>
+            <a:r>
+              <a:rPr/>
+              <a:t>work</a:t>
+            </a:r>
+            <a:r>
+              <a:rPr/>
+              <a:t> </a:t>
+            </a:r>
+            <a:r>
+              <a:rPr/>
+              <a:t>that</a:t>
+            </a:r>
+            <a:r>
+              <a:rPr/>
+              <a:t> </a:t>
+            </a:r>
+            <a:r>
+              <a:rPr/>
+              <a:t>you</a:t>
+            </a:r>
+            <a:r>
+              <a:rPr/>
+              <a:t> </a:t>
+            </a:r>
+            <a:r>
+              <a:rPr/>
+              <a:t>need</a:t>
+            </a:r>
+            <a:r>
+              <a:rPr/>
+              <a:t> </a:t>
+            </a:r>
+            <a:r>
+              <a:rPr/>
+              <a:t>to</a:t>
+            </a:r>
+            <a:r>
+              <a:rPr/>
+              <a:t> </a:t>
+            </a:r>
+            <a:r>
+              <a:rPr/>
+              <a:t>do</a:t>
+            </a:r>
+            <a:r>
+              <a:rPr/>
+              <a:t> </a:t>
+            </a:r>
+            <a:r>
+              <a:rPr/>
+              <a:t>for</a:t>
+            </a:r>
+            <a:r>
+              <a:rPr/>
+              <a:t> </a:t>
+            </a:r>
+            <a:r>
+              <a:rPr/>
+              <a:t>this</a:t>
+            </a:r>
+            <a:r>
+              <a:rPr/>
+              <a:t> </a:t>
+            </a:r>
+            <a:r>
+              <a:rPr/>
+              <a:t>module.</a:t>
+            </a:r>
+          </a:p>
+        </p:txBody>
+      </p:sp>
+      <p:sp>
+        <p:nvSpPr>
+          <p:cNvPr id="4" name="Slide Number Placeholder 3"/>
+          <p:cNvSpPr>
+            <a:spLocks noGrp="1"/>
+          </p:cNvSpPr>
+          <p:nvPr>
+            <p:ph type="sldNum" sz="quarter" idx="10"/>
+          </p:nvPr>
+        </p:nvSpPr>
+        <p:spPr/>
+        <p:txBody>
+          <a:bodyPr/>
+          <a:lstStyle/>
+          <a:p>
+            <a:fld id="{18BDFEC3-8487-43E8-A154-7C12CBC1FFF2}" type="slidenum">
+              <a:rPr lang="en-US"/>
+              <a:t>23</a:t>
             </a:fld>
             <a:endParaRPr lang="en-US"/>
           </a:p>
@@ -10476,15 +10981,23 @@
             </a:r>
             <a:r>
               <a:rPr/>
-              <a:t>Data</a:t>
-            </a:r>
-            <a:r>
-              <a:rPr/>
-              <a:t> </a:t>
-            </a:r>
-            <a:r>
-              <a:rPr/>
-              <a:t>frames</a:t>
+              <a:t>A</a:t>
+            </a:r>
+            <a:r>
+              <a:rPr/>
+              <a:t> </a:t>
+            </a:r>
+            <a:r>
+              <a:rPr/>
+              <a:t>small</a:t>
+            </a:r>
+            <a:r>
+              <a:rPr/>
+              <a:t> </a:t>
+            </a:r>
+            <a:r>
+              <a:rPr/>
+              <a:t>program</a:t>
             </a:r>
           </a:p>
         </p:txBody>
@@ -11293,7 +11806,7 @@
                 <a:latin typeface="Courier"/>
               </a:rPr>
               <a:t>
-This is a very simple program, but iIf you can get this program to run, you will probably have smooth sailing for the rest of the class.</a:t>
+This is a very simple program, but if you can get this program to run, you will probably have smooth sailing for the rest of the class.</a:t>
             </a:r>
           </a:p>
         </p:txBody>
@@ -12192,7 +12705,7 @@
             <a:pPr lvl="2"/>
             <a:r>
               <a:rPr/>
-              <a:t>Buy beyond scope of this class</a:t>
+              <a:t>But beyond scope of this class</a:t>
             </a:r>
           </a:p>
           <a:p>
@@ -12754,6 +13267,104 @@
             <a:r>
               <a:rPr/>
               <a:t>text</a:t>
+            </a:r>
+          </a:p>
+        </p:txBody>
+      </p:sp>
+    </p:spTree>
+  </p:cSld>
+</p:sld>
+</file>
+
+<file path=ppt/slides/slide23.xml><?xml version="1.0" encoding="utf-8"?>
+<p:sld xmlns:a="http://schemas.openxmlformats.org/drawingml/2006/main" xmlns:r="http://schemas.openxmlformats.org/officeDocument/2006/relationships" xmlns:p="http://schemas.openxmlformats.org/presentationml/2006/main">
+  <p:cSld>
+    <p:spTree>
+      <p:nvGrpSpPr>
+        <p:cNvPr id="1" name=""/>
+        <p:cNvGrpSpPr/>
+        <p:nvPr/>
+      </p:nvGrpSpPr>
+      <p:grpSpPr>
+        <a:xfrm>
+          <a:off x="0" y="0"/>
+          <a:ext cx="0" cy="0"/>
+          <a:chOff x="0" y="0"/>
+          <a:chExt cx="0" cy="0"/>
+        </a:xfrm>
+      </p:grpSpPr>
+      <p:sp>
+        <p:nvSpPr>
+          <p:cNvPr id="2" name="Title 1"/>
+          <p:cNvSpPr>
+            <a:spLocks noGrp="1"/>
+          </p:cNvSpPr>
+          <p:nvPr>
+            <p:ph type="title"/>
+          </p:nvPr>
+        </p:nvSpPr>
+        <p:spPr/>
+        <p:txBody>
+          <a:bodyPr/>
+          <a:lstStyle/>
+          <a:p>
+            <a:pPr lvl="0" marL="0" indent="0">
+              <a:buNone/>
+            </a:pPr>
+            <a:r>
+              <a:rPr/>
+              <a:t>Review</a:t>
+            </a:r>
+          </a:p>
+        </p:txBody>
+      </p:sp>
+      <p:sp>
+        <p:nvSpPr>
+          <p:cNvPr id="3" name="Content Placeholder 2"/>
+          <p:cNvSpPr>
+            <a:spLocks noGrp="1"/>
+          </p:cNvSpPr>
+          <p:nvPr>
+            <p:ph idx="1"/>
+          </p:nvPr>
+        </p:nvSpPr>
+        <p:spPr/>
+        <p:txBody>
+          <a:bodyPr/>
+          <a:lstStyle/>
+          <a:p>
+            <a:pPr lvl="1"/>
+            <a:r>
+              <a:rPr/>
+              <a:t>In this video, you saw</a:t>
+            </a:r>
+          </a:p>
+          <a:p>
+            <a:pPr lvl="2"/>
+            <a:r>
+              <a:rPr/>
+              <a:t>Installation pages for R, RStudio</a:t>
+            </a:r>
+          </a:p>
+          <a:p>
+            <a:pPr lvl="2"/>
+            <a:r>
+              <a:rPr/>
+              <a:t>Anatomy of a small program</a:t>
+            </a:r>
+          </a:p>
+          <a:p>
+            <a:pPr lvl="2"/>
+            <a:r>
+              <a:rPr/>
+              <a:t>Output from the small program</a:t>
+            </a:r>
+          </a:p>
+          <a:p>
+            <a:pPr lvl="1"/>
+            <a:r>
+              <a:rPr/>
+              <a:t>Review Canvas for the work assigned to this module</a:t>
             </a:r>
           </a:p>
         </p:txBody>

</xml_diff>